<commit_message>
Add table to presentation
</commit_message>
<xml_diff>
--- a/v.haponov/Presentation/Valentyn_Haponov.pptx
+++ b/v.haponov/Presentation/Valentyn_Haponov.pptx
@@ -14,6 +14,7 @@
     <p:sldId id="261" r:id="rId8"/>
     <p:sldId id="262" r:id="rId9"/>
     <p:sldId id="264" r:id="rId10"/>
+    <p:sldId id="265" r:id="rId11"/>
   </p:sldIdLst>
   <p:sldSz cx="12192000" cy="6858000"/>
   <p:notesSz cx="6858000" cy="9144000"/>
@@ -267,7 +268,7 @@
           <a:p>
             <a:fld id="{FCA662B4-D131-4ADB-BA10-D9BA9FBC173B}" type="datetimeFigureOut">
               <a:rPr lang="ru-RU" smtClean="0"/>
-              <a:t>04.06.2020</a:t>
+              <a:t>05.06.2020</a:t>
             </a:fld>
             <a:endParaRPr lang="ru-RU"/>
           </a:p>
@@ -465,7 +466,7 @@
           <a:p>
             <a:fld id="{FCA662B4-D131-4ADB-BA10-D9BA9FBC173B}" type="datetimeFigureOut">
               <a:rPr lang="ru-RU" smtClean="0"/>
-              <a:t>04.06.2020</a:t>
+              <a:t>05.06.2020</a:t>
             </a:fld>
             <a:endParaRPr lang="ru-RU"/>
           </a:p>
@@ -673,7 +674,7 @@
           <a:p>
             <a:fld id="{FCA662B4-D131-4ADB-BA10-D9BA9FBC173B}" type="datetimeFigureOut">
               <a:rPr lang="ru-RU" smtClean="0"/>
-              <a:t>04.06.2020</a:t>
+              <a:t>05.06.2020</a:t>
             </a:fld>
             <a:endParaRPr lang="ru-RU"/>
           </a:p>
@@ -871,7 +872,7 @@
           <a:p>
             <a:fld id="{FCA662B4-D131-4ADB-BA10-D9BA9FBC173B}" type="datetimeFigureOut">
               <a:rPr lang="ru-RU" smtClean="0"/>
-              <a:t>04.06.2020</a:t>
+              <a:t>05.06.2020</a:t>
             </a:fld>
             <a:endParaRPr lang="ru-RU"/>
           </a:p>
@@ -1146,7 +1147,7 @@
           <a:p>
             <a:fld id="{FCA662B4-D131-4ADB-BA10-D9BA9FBC173B}" type="datetimeFigureOut">
               <a:rPr lang="ru-RU" smtClean="0"/>
-              <a:t>04.06.2020</a:t>
+              <a:t>05.06.2020</a:t>
             </a:fld>
             <a:endParaRPr lang="ru-RU"/>
           </a:p>
@@ -1411,7 +1412,7 @@
           <a:p>
             <a:fld id="{FCA662B4-D131-4ADB-BA10-D9BA9FBC173B}" type="datetimeFigureOut">
               <a:rPr lang="ru-RU" smtClean="0"/>
-              <a:t>04.06.2020</a:t>
+              <a:t>05.06.2020</a:t>
             </a:fld>
             <a:endParaRPr lang="ru-RU"/>
           </a:p>
@@ -1823,7 +1824,7 @@
           <a:p>
             <a:fld id="{FCA662B4-D131-4ADB-BA10-D9BA9FBC173B}" type="datetimeFigureOut">
               <a:rPr lang="ru-RU" smtClean="0"/>
-              <a:t>04.06.2020</a:t>
+              <a:t>05.06.2020</a:t>
             </a:fld>
             <a:endParaRPr lang="ru-RU"/>
           </a:p>
@@ -1964,7 +1965,7 @@
           <a:p>
             <a:fld id="{FCA662B4-D131-4ADB-BA10-D9BA9FBC173B}" type="datetimeFigureOut">
               <a:rPr lang="ru-RU" smtClean="0"/>
-              <a:t>04.06.2020</a:t>
+              <a:t>05.06.2020</a:t>
             </a:fld>
             <a:endParaRPr lang="ru-RU"/>
           </a:p>
@@ -2077,7 +2078,7 @@
           <a:p>
             <a:fld id="{FCA662B4-D131-4ADB-BA10-D9BA9FBC173B}" type="datetimeFigureOut">
               <a:rPr lang="ru-RU" smtClean="0"/>
-              <a:t>04.06.2020</a:t>
+              <a:t>05.06.2020</a:t>
             </a:fld>
             <a:endParaRPr lang="ru-RU"/>
           </a:p>
@@ -2388,7 +2389,7 @@
           <a:p>
             <a:fld id="{FCA662B4-D131-4ADB-BA10-D9BA9FBC173B}" type="datetimeFigureOut">
               <a:rPr lang="ru-RU" smtClean="0"/>
-              <a:t>04.06.2020</a:t>
+              <a:t>05.06.2020</a:t>
             </a:fld>
             <a:endParaRPr lang="ru-RU"/>
           </a:p>
@@ -2676,7 +2677,7 @@
           <a:p>
             <a:fld id="{FCA662B4-D131-4ADB-BA10-D9BA9FBC173B}" type="datetimeFigureOut">
               <a:rPr lang="ru-RU" smtClean="0"/>
-              <a:t>04.06.2020</a:t>
+              <a:t>05.06.2020</a:t>
             </a:fld>
             <a:endParaRPr lang="ru-RU"/>
           </a:p>
@@ -2917,7 +2918,7 @@
           <a:p>
             <a:fld id="{FCA662B4-D131-4ADB-BA10-D9BA9FBC173B}" type="datetimeFigureOut">
               <a:rPr lang="ru-RU" smtClean="0"/>
-              <a:t>04.06.2020</a:t>
+              <a:t>05.06.2020</a:t>
             </a:fld>
             <a:endParaRPr lang="ru-RU"/>
           </a:p>
@@ -3507,6 +3508,138 @@
 </p:sld>
 </file>
 
+<file path=ppt/slides/slide10.xml><?xml version="1.0" encoding="utf-8"?>
+<p:sld xmlns:a="http://schemas.openxmlformats.org/drawingml/2006/main" xmlns:r="http://schemas.openxmlformats.org/officeDocument/2006/relationships" xmlns:p="http://schemas.openxmlformats.org/presentationml/2006/main">
+  <p:cSld>
+    <p:spTree>
+      <p:nvGrpSpPr>
+        <p:cNvPr id="1" name=""/>
+        <p:cNvGrpSpPr/>
+        <p:nvPr/>
+      </p:nvGrpSpPr>
+      <p:grpSpPr>
+        <a:xfrm>
+          <a:off x="0" y="0"/>
+          <a:ext cx="0" cy="0"/>
+          <a:chOff x="0" y="0"/>
+          <a:chExt cx="0" cy="0"/>
+        </a:xfrm>
+      </p:grpSpPr>
+      <p:sp>
+        <p:nvSpPr>
+          <p:cNvPr id="2" name="Заголовок 1">
+            <a:extLst>
+              <a:ext uri="{FF2B5EF4-FFF2-40B4-BE49-F238E27FC236}">
+                <a16:creationId xmlns:a16="http://schemas.microsoft.com/office/drawing/2014/main" id="{D303373A-4E9D-456E-B49B-0AC8E4AA5F36}"/>
+              </a:ext>
+            </a:extLst>
+          </p:cNvPr>
+          <p:cNvSpPr>
+            <a:spLocks noGrp="1"/>
+          </p:cNvSpPr>
+          <p:nvPr>
+            <p:ph type="title"/>
+          </p:nvPr>
+        </p:nvSpPr>
+        <p:spPr/>
+        <p:txBody>
+          <a:bodyPr>
+            <a:normAutofit/>
+          </a:bodyPr>
+          <a:lstStyle/>
+          <a:p>
+            <a:r>
+              <a:rPr lang="ru-RU" sz="4000" b="1" dirty="0" err="1"/>
+              <a:t>Результати</a:t>
+            </a:r>
+            <a:endParaRPr lang="ru-RU" sz="4000" b="1" dirty="0"/>
+          </a:p>
+        </p:txBody>
+      </p:sp>
+      <p:pic>
+        <p:nvPicPr>
+          <p:cNvPr id="5" name="Объект 4">
+            <a:extLst>
+              <a:ext uri="{FF2B5EF4-FFF2-40B4-BE49-F238E27FC236}">
+                <a16:creationId xmlns:a16="http://schemas.microsoft.com/office/drawing/2014/main" id="{3CBB96C1-40EF-49D4-8C10-FC23DAA62D85}"/>
+              </a:ext>
+            </a:extLst>
+          </p:cNvPr>
+          <p:cNvPicPr>
+            <a:picLocks noGrp="1" noChangeAspect="1"/>
+          </p:cNvPicPr>
+          <p:nvPr>
+            <p:ph idx="1"/>
+          </p:nvPr>
+        </p:nvPicPr>
+        <p:blipFill>
+          <a:blip r:embed="rId2">
+            <a:extLst>
+              <a:ext uri="{28A0092B-C50C-407E-A947-70E740481C1C}">
+                <a14:useLocalDpi xmlns:a14="http://schemas.microsoft.com/office/drawing/2010/main" val="0"/>
+              </a:ext>
+            </a:extLst>
+          </a:blip>
+          <a:stretch>
+            <a:fillRect/>
+          </a:stretch>
+        </p:blipFill>
+        <p:spPr>
+          <a:xfrm>
+            <a:off x="4785227" y="4223308"/>
+            <a:ext cx="2495140" cy="2525943"/>
+          </a:xfrm>
+        </p:spPr>
+      </p:pic>
+      <p:pic>
+        <p:nvPicPr>
+          <p:cNvPr id="7" name="Рисунок 6">
+            <a:extLst>
+              <a:ext uri="{FF2B5EF4-FFF2-40B4-BE49-F238E27FC236}">
+                <a16:creationId xmlns:a16="http://schemas.microsoft.com/office/drawing/2014/main" id="{43044326-8D75-4C63-9226-CB571BE66641}"/>
+              </a:ext>
+            </a:extLst>
+          </p:cNvPr>
+          <p:cNvPicPr>
+            <a:picLocks noChangeAspect="1"/>
+          </p:cNvPicPr>
+          <p:nvPr/>
+        </p:nvPicPr>
+        <p:blipFill>
+          <a:blip r:embed="rId3">
+            <a:extLst>
+              <a:ext uri="{28A0092B-C50C-407E-A947-70E740481C1C}">
+                <a14:useLocalDpi xmlns:a14="http://schemas.microsoft.com/office/drawing/2010/main" val="0"/>
+              </a:ext>
+            </a:extLst>
+          </a:blip>
+          <a:stretch>
+            <a:fillRect/>
+          </a:stretch>
+        </p:blipFill>
+        <p:spPr>
+          <a:xfrm>
+            <a:off x="1184366" y="1420493"/>
+            <a:ext cx="9823268" cy="2802816"/>
+          </a:xfrm>
+          <a:prstGeom prst="rect">
+            <a:avLst/>
+          </a:prstGeom>
+        </p:spPr>
+      </p:pic>
+    </p:spTree>
+    <p:extLst>
+      <p:ext uri="{BB962C8B-B14F-4D97-AF65-F5344CB8AC3E}">
+        <p14:creationId xmlns:p14="http://schemas.microsoft.com/office/powerpoint/2010/main" val="1189532417"/>
+      </p:ext>
+    </p:extLst>
+  </p:cSld>
+  <p:clrMapOvr>
+    <a:masterClrMapping/>
+  </p:clrMapOvr>
+</p:sld>
+</file>
+
 <file path=ppt/slides/slide2.xml><?xml version="1.0" encoding="utf-8"?>
 <p:sld xmlns:a="http://schemas.openxmlformats.org/drawingml/2006/main" xmlns:r="http://schemas.openxmlformats.org/officeDocument/2006/relationships" xmlns:p="http://schemas.openxmlformats.org/presentationml/2006/main">
   <p:cSld>

</xml_diff>

<commit_message>
Update fix presentation add model's validation update report fix mistake
</commit_message>
<xml_diff>
--- a/v.haponov/Presentation/Valentyn_Haponov.pptx
+++ b/v.haponov/Presentation/Valentyn_Haponov.pptx
@@ -16,6 +16,8 @@
     <p:sldId id="264" r:id="rId10"/>
     <p:sldId id="265" r:id="rId11"/>
     <p:sldId id="266" r:id="rId12"/>
+    <p:sldId id="268" r:id="rId13"/>
+    <p:sldId id="269" r:id="rId14"/>
   </p:sldIdLst>
   <p:sldSz cx="12192000" cy="6858000"/>
   <p:notesSz cx="6858000" cy="9144000"/>
@@ -269,7 +271,7 @@
           <a:p>
             <a:fld id="{FCA662B4-D131-4ADB-BA10-D9BA9FBC173B}" type="datetimeFigureOut">
               <a:rPr lang="ru-RU" smtClean="0"/>
-              <a:t>08.06.2020</a:t>
+              <a:t>09.06.2020</a:t>
             </a:fld>
             <a:endParaRPr lang="ru-RU"/>
           </a:p>
@@ -467,7 +469,7 @@
           <a:p>
             <a:fld id="{FCA662B4-D131-4ADB-BA10-D9BA9FBC173B}" type="datetimeFigureOut">
               <a:rPr lang="ru-RU" smtClean="0"/>
-              <a:t>08.06.2020</a:t>
+              <a:t>09.06.2020</a:t>
             </a:fld>
             <a:endParaRPr lang="ru-RU"/>
           </a:p>
@@ -675,7 +677,7 @@
           <a:p>
             <a:fld id="{FCA662B4-D131-4ADB-BA10-D9BA9FBC173B}" type="datetimeFigureOut">
               <a:rPr lang="ru-RU" smtClean="0"/>
-              <a:t>08.06.2020</a:t>
+              <a:t>09.06.2020</a:t>
             </a:fld>
             <a:endParaRPr lang="ru-RU"/>
           </a:p>
@@ -873,7 +875,7 @@
           <a:p>
             <a:fld id="{FCA662B4-D131-4ADB-BA10-D9BA9FBC173B}" type="datetimeFigureOut">
               <a:rPr lang="ru-RU" smtClean="0"/>
-              <a:t>08.06.2020</a:t>
+              <a:t>09.06.2020</a:t>
             </a:fld>
             <a:endParaRPr lang="ru-RU"/>
           </a:p>
@@ -1148,7 +1150,7 @@
           <a:p>
             <a:fld id="{FCA662B4-D131-4ADB-BA10-D9BA9FBC173B}" type="datetimeFigureOut">
               <a:rPr lang="ru-RU" smtClean="0"/>
-              <a:t>08.06.2020</a:t>
+              <a:t>09.06.2020</a:t>
             </a:fld>
             <a:endParaRPr lang="ru-RU"/>
           </a:p>
@@ -1413,7 +1415,7 @@
           <a:p>
             <a:fld id="{FCA662B4-D131-4ADB-BA10-D9BA9FBC173B}" type="datetimeFigureOut">
               <a:rPr lang="ru-RU" smtClean="0"/>
-              <a:t>08.06.2020</a:t>
+              <a:t>09.06.2020</a:t>
             </a:fld>
             <a:endParaRPr lang="ru-RU"/>
           </a:p>
@@ -1825,7 +1827,7 @@
           <a:p>
             <a:fld id="{FCA662B4-D131-4ADB-BA10-D9BA9FBC173B}" type="datetimeFigureOut">
               <a:rPr lang="ru-RU" smtClean="0"/>
-              <a:t>08.06.2020</a:t>
+              <a:t>09.06.2020</a:t>
             </a:fld>
             <a:endParaRPr lang="ru-RU"/>
           </a:p>
@@ -1966,7 +1968,7 @@
           <a:p>
             <a:fld id="{FCA662B4-D131-4ADB-BA10-D9BA9FBC173B}" type="datetimeFigureOut">
               <a:rPr lang="ru-RU" smtClean="0"/>
-              <a:t>08.06.2020</a:t>
+              <a:t>09.06.2020</a:t>
             </a:fld>
             <a:endParaRPr lang="ru-RU"/>
           </a:p>
@@ -2079,7 +2081,7 @@
           <a:p>
             <a:fld id="{FCA662B4-D131-4ADB-BA10-D9BA9FBC173B}" type="datetimeFigureOut">
               <a:rPr lang="ru-RU" smtClean="0"/>
-              <a:t>08.06.2020</a:t>
+              <a:t>09.06.2020</a:t>
             </a:fld>
             <a:endParaRPr lang="ru-RU"/>
           </a:p>
@@ -2390,7 +2392,7 @@
           <a:p>
             <a:fld id="{FCA662B4-D131-4ADB-BA10-D9BA9FBC173B}" type="datetimeFigureOut">
               <a:rPr lang="ru-RU" smtClean="0"/>
-              <a:t>08.06.2020</a:t>
+              <a:t>09.06.2020</a:t>
             </a:fld>
             <a:endParaRPr lang="ru-RU"/>
           </a:p>
@@ -2678,7 +2680,7 @@
           <a:p>
             <a:fld id="{FCA662B4-D131-4ADB-BA10-D9BA9FBC173B}" type="datetimeFigureOut">
               <a:rPr lang="ru-RU" smtClean="0"/>
-              <a:t>08.06.2020</a:t>
+              <a:t>09.06.2020</a:t>
             </a:fld>
             <a:endParaRPr lang="ru-RU"/>
           </a:p>
@@ -2919,7 +2921,7 @@
           <a:p>
             <a:fld id="{FCA662B4-D131-4ADB-BA10-D9BA9FBC173B}" type="datetimeFigureOut">
               <a:rPr lang="ru-RU" smtClean="0"/>
-              <a:t>08.06.2020</a:t>
+              <a:t>09.06.2020</a:t>
             </a:fld>
             <a:endParaRPr lang="ru-RU"/>
           </a:p>
@@ -3767,6 +3769,137 @@
 </p:sld>
 </file>
 
+<file path=ppt/slides/slide12.xml><?xml version="1.0" encoding="utf-8"?>
+<p:sld xmlns:a="http://schemas.openxmlformats.org/drawingml/2006/main" xmlns:r="http://schemas.openxmlformats.org/officeDocument/2006/relationships" xmlns:p="http://schemas.openxmlformats.org/presentationml/2006/main">
+  <p:cSld>
+    <p:spTree>
+      <p:nvGrpSpPr>
+        <p:cNvPr id="1" name=""/>
+        <p:cNvGrpSpPr/>
+        <p:nvPr/>
+      </p:nvGrpSpPr>
+      <p:grpSpPr>
+        <a:xfrm>
+          <a:off x="0" y="0"/>
+          <a:ext cx="0" cy="0"/>
+          <a:chOff x="0" y="0"/>
+          <a:chExt cx="0" cy="0"/>
+        </a:xfrm>
+      </p:grpSpPr>
+      <p:sp>
+        <p:nvSpPr>
+          <p:cNvPr id="2" name="Заголовок 1">
+            <a:extLst>
+              <a:ext uri="{FF2B5EF4-FFF2-40B4-BE49-F238E27FC236}">
+                <a16:creationId xmlns:a16="http://schemas.microsoft.com/office/drawing/2014/main" id="{5BA96783-AF9E-45BF-99D5-377333BC448F}"/>
+              </a:ext>
+            </a:extLst>
+          </p:cNvPr>
+          <p:cNvSpPr>
+            <a:spLocks noGrp="1"/>
+          </p:cNvSpPr>
+          <p:nvPr>
+            <p:ph type="title"/>
+          </p:nvPr>
+        </p:nvSpPr>
+        <p:spPr>
+          <a:xfrm>
+            <a:off x="838200" y="2766218"/>
+            <a:ext cx="10515600" cy="1325563"/>
+          </a:xfrm>
+        </p:spPr>
+        <p:txBody>
+          <a:bodyPr/>
+          <a:lstStyle/>
+          <a:p>
+            <a:pPr algn="ctr"/>
+            <a:r>
+              <a:rPr lang="uk-UA" b="1" dirty="0"/>
+              <a:t>Дякую за увагу </a:t>
+            </a:r>
+            <a:endParaRPr lang="ru-RU" b="1" dirty="0"/>
+          </a:p>
+        </p:txBody>
+      </p:sp>
+    </p:spTree>
+    <p:extLst>
+      <p:ext uri="{BB962C8B-B14F-4D97-AF65-F5344CB8AC3E}">
+        <p14:creationId xmlns:p14="http://schemas.microsoft.com/office/powerpoint/2010/main" val="3845752450"/>
+      </p:ext>
+    </p:extLst>
+  </p:cSld>
+  <p:clrMapOvr>
+    <a:masterClrMapping/>
+  </p:clrMapOvr>
+</p:sld>
+</file>
+
+<file path=ppt/slides/slide13.xml><?xml version="1.0" encoding="utf-8"?>
+<p:sld xmlns:a="http://schemas.openxmlformats.org/drawingml/2006/main" xmlns:r="http://schemas.openxmlformats.org/officeDocument/2006/relationships" xmlns:p="http://schemas.openxmlformats.org/presentationml/2006/main">
+  <p:cSld>
+    <p:spTree>
+      <p:nvGrpSpPr>
+        <p:cNvPr id="1" name=""/>
+        <p:cNvGrpSpPr/>
+        <p:nvPr/>
+      </p:nvGrpSpPr>
+      <p:grpSpPr>
+        <a:xfrm>
+          <a:off x="0" y="0"/>
+          <a:ext cx="0" cy="0"/>
+          <a:chOff x="0" y="0"/>
+          <a:chExt cx="0" cy="0"/>
+        </a:xfrm>
+      </p:grpSpPr>
+      <p:pic>
+        <p:nvPicPr>
+          <p:cNvPr id="4" name="Объект 4">
+            <a:extLst>
+              <a:ext uri="{FF2B5EF4-FFF2-40B4-BE49-F238E27FC236}">
+                <a16:creationId xmlns:a16="http://schemas.microsoft.com/office/drawing/2014/main" id="{77932D23-C5B9-4C02-8AF8-3B7545483B5C}"/>
+              </a:ext>
+            </a:extLst>
+          </p:cNvPr>
+          <p:cNvPicPr>
+            <a:picLocks noChangeAspect="1"/>
+          </p:cNvPicPr>
+          <p:nvPr/>
+        </p:nvPicPr>
+        <p:blipFill>
+          <a:blip r:embed="rId2">
+            <a:extLst>
+              <a:ext uri="{28A0092B-C50C-407E-A947-70E740481C1C}">
+                <a14:useLocalDpi xmlns:a14="http://schemas.microsoft.com/office/drawing/2010/main" val="0"/>
+              </a:ext>
+            </a:extLst>
+          </a:blip>
+          <a:stretch>
+            <a:fillRect/>
+          </a:stretch>
+        </p:blipFill>
+        <p:spPr>
+          <a:xfrm>
+            <a:off x="-2" y="0"/>
+            <a:ext cx="12192001" cy="6858000"/>
+          </a:xfrm>
+          <a:prstGeom prst="rect">
+            <a:avLst/>
+          </a:prstGeom>
+        </p:spPr>
+      </p:pic>
+    </p:spTree>
+    <p:extLst>
+      <p:ext uri="{BB962C8B-B14F-4D97-AF65-F5344CB8AC3E}">
+        <p14:creationId xmlns:p14="http://schemas.microsoft.com/office/powerpoint/2010/main" val="112437279"/>
+      </p:ext>
+    </p:extLst>
+  </p:cSld>
+  <p:clrMapOvr>
+    <a:masterClrMapping/>
+  </p:clrMapOvr>
+</p:sld>
+</file>
+
 <file path=ppt/slides/slide2.xml><?xml version="1.0" encoding="utf-8"?>
 <p:sld xmlns:a="http://schemas.openxmlformats.org/drawingml/2006/main" xmlns:r="http://schemas.openxmlformats.org/officeDocument/2006/relationships" xmlns:p="http://schemas.openxmlformats.org/presentationml/2006/main">
   <p:cSld>
@@ -3863,7 +3996,18 @@
               <a:rPr lang="ru-RU" dirty="0" err="1"/>
               <a:t>Моделі</a:t>
             </a:r>
-            <a:endParaRPr lang="ru-RU" dirty="0"/>
+            <a:r>
+              <a:rPr lang="ru-RU" dirty="0"/>
+              <a:t> та </a:t>
+            </a:r>
+            <a:r>
+              <a:rPr lang="ru-RU" dirty="0" err="1"/>
+              <a:t>захисту</a:t>
+            </a:r>
+            <a:r>
+              <a:rPr lang="ru-RU" dirty="0"/>
+              <a:t> детектора</a:t>
+            </a:r>
           </a:p>
           <a:p>
             <a:r>
@@ -3928,6 +4072,18 @@
             <a:endParaRPr lang="ru-RU" dirty="0"/>
           </a:p>
           <a:p>
+            <a:r>
+              <a:rPr lang="ru-RU" dirty="0" err="1"/>
+              <a:t>Додаткові</a:t>
+            </a:r>
+            <a:r>
+              <a:rPr lang="ru-RU" dirty="0"/>
+              <a:t> </a:t>
+            </a:r>
+            <a:r>
+              <a:rPr lang="ru-RU" dirty="0" err="1"/>
+              <a:t>слайди</a:t>
+            </a:r>
             <a:endParaRPr lang="ru-RU" dirty="0"/>
           </a:p>
         </p:txBody>
@@ -4383,7 +4539,7 @@
           <a:p>
             <a:r>
               <a:rPr lang="uk-UA" b="1" dirty="0"/>
-              <a:t>Геометрія моделі</a:t>
+              <a:t>Геометрія моделі та захисту детектора</a:t>
             </a:r>
             <a:endParaRPr lang="ru-RU" b="1" dirty="0"/>
           </a:p>
@@ -4505,8 +4661,8 @@
           </a:p>
         </p:txBody>
       </p:sp>
-      <mc:AlternateContent xmlns:mc="http://schemas.openxmlformats.org/markup-compatibility/2006">
-        <mc:Choice xmlns:a14="http://schemas.microsoft.com/office/drawing/2010/main" Requires="a14">
+      <mc:AlternateContent xmlns:mc="http://schemas.openxmlformats.org/markup-compatibility/2006" xmlns:a14="http://schemas.microsoft.com/office/drawing/2010/main">
+        <mc:Choice Requires="a14">
           <p:sp>
             <p:nvSpPr>
               <p:cNvPr id="10" name="TextBox 9">
@@ -4616,7 +4772,7 @@
             </p:txBody>
           </p:sp>
         </mc:Choice>
-        <mc:Fallback>
+        <mc:Fallback xmlns="">
           <p:sp>
             <p:nvSpPr>
               <p:cNvPr id="10" name="TextBox 9">
@@ -4725,8 +4881,8 @@
           </a:p>
         </p:txBody>
       </p:sp>
-      <mc:AlternateContent xmlns:mc="http://schemas.openxmlformats.org/markup-compatibility/2006">
-        <mc:Choice xmlns:a14="http://schemas.microsoft.com/office/drawing/2010/main" Requires="a14">
+      <mc:AlternateContent xmlns:mc="http://schemas.openxmlformats.org/markup-compatibility/2006" xmlns:a14="http://schemas.microsoft.com/office/drawing/2010/main">
+        <mc:Choice Requires="a14">
           <p:sp>
             <p:nvSpPr>
               <p:cNvPr id="3" name="Объект 2">
@@ -4858,7 +5014,7 @@
             </p:txBody>
           </p:sp>
         </mc:Choice>
-        <mc:Fallback>
+        <mc:Fallback xmlns="">
           <p:sp>
             <p:nvSpPr>
               <p:cNvPr id="3" name="Объект 2">
@@ -4961,8 +5117,8 @@
           </a:p>
         </p:txBody>
       </p:sp>
-      <mc:AlternateContent xmlns:mc="http://schemas.openxmlformats.org/markup-compatibility/2006">
-        <mc:Choice xmlns:a14="http://schemas.microsoft.com/office/drawing/2010/main" Requires="a14">
+      <mc:AlternateContent xmlns:mc="http://schemas.openxmlformats.org/markup-compatibility/2006" xmlns:a14="http://schemas.microsoft.com/office/drawing/2010/main">
+        <mc:Choice Requires="a14">
           <p:sp>
             <p:nvSpPr>
               <p:cNvPr id="5" name="Объект 2">
@@ -5278,7 +5434,7 @@
             </p:txBody>
           </p:sp>
         </mc:Choice>
-        <mc:Fallback>
+        <mc:Fallback xmlns="">
           <p:sp>
             <p:nvSpPr>
               <p:cNvPr id="5" name="Объект 2">
@@ -5515,11 +5671,174 @@
         </p:blipFill>
         <p:spPr>
           <a:xfrm>
-            <a:off x="751115" y="906160"/>
-            <a:ext cx="10273697" cy="5715428"/>
+            <a:off x="4950932" y="1012606"/>
+            <a:ext cx="7127856" cy="4832788"/>
           </a:xfrm>
         </p:spPr>
       </p:pic>
+      <p:sp>
+        <p:nvSpPr>
+          <p:cNvPr id="4" name="TextBox 3">
+            <a:extLst>
+              <a:ext uri="{FF2B5EF4-FFF2-40B4-BE49-F238E27FC236}">
+                <a16:creationId xmlns:a16="http://schemas.microsoft.com/office/drawing/2014/main" id="{E92A91C8-379F-4406-9F91-D17A85F71249}"/>
+              </a:ext>
+            </a:extLst>
+          </p:cNvPr>
+          <p:cNvSpPr txBox="1"/>
+          <p:nvPr/>
+        </p:nvSpPr>
+        <p:spPr>
+          <a:xfrm>
+            <a:off x="513806" y="1236617"/>
+            <a:ext cx="4162397" cy="1200329"/>
+          </a:xfrm>
+          <a:prstGeom prst="rect">
+            <a:avLst/>
+          </a:prstGeom>
+          <a:noFill/>
+        </p:spPr>
+        <p:txBody>
+          <a:bodyPr wrap="square" rtlCol="0">
+            <a:spAutoFit/>
+          </a:bodyPr>
+          <a:lstStyle/>
+          <a:p>
+            <a:r>
+              <a:rPr lang="uk-UA" dirty="0"/>
+              <a:t>Запропонована модель, та модель з проекту </a:t>
+            </a:r>
+            <a:r>
+              <a:rPr lang="en-US" dirty="0"/>
+              <a:t>SABAT </a:t>
+            </a:r>
+            <a:r>
+              <a:rPr lang="uk-UA" dirty="0"/>
+              <a:t>знаходяться у схожих умовах, тому щоб </a:t>
+            </a:r>
+            <a:r>
+              <a:rPr lang="uk-UA" dirty="0" err="1"/>
+              <a:t>валідувати</a:t>
+            </a:r>
+            <a:r>
+              <a:rPr lang="uk-UA" dirty="0"/>
+              <a:t> модель був набраний спектр гірчичного газу </a:t>
+            </a:r>
+            <a:endParaRPr lang="ru-RU" dirty="0"/>
+          </a:p>
+        </p:txBody>
+      </p:sp>
+      <p:pic>
+        <p:nvPicPr>
+          <p:cNvPr id="5" name="Рисунок 4">
+            <a:extLst>
+              <a:ext uri="{FF2B5EF4-FFF2-40B4-BE49-F238E27FC236}">
+                <a16:creationId xmlns:a16="http://schemas.microsoft.com/office/drawing/2014/main" id="{FD61563B-9AF6-4820-8391-07EDCDCA7721}"/>
+              </a:ext>
+            </a:extLst>
+          </p:cNvPr>
+          <p:cNvPicPr>
+            <a:picLocks noChangeAspect="1"/>
+          </p:cNvPicPr>
+          <p:nvPr/>
+        </p:nvPicPr>
+        <p:blipFill>
+          <a:blip r:embed="rId3"/>
+          <a:stretch>
+            <a:fillRect/>
+          </a:stretch>
+        </p:blipFill>
+        <p:spPr>
+          <a:xfrm>
+            <a:off x="317977" y="3021874"/>
+            <a:ext cx="4778306" cy="3339737"/>
+          </a:xfrm>
+          <a:prstGeom prst="rect">
+            <a:avLst/>
+          </a:prstGeom>
+        </p:spPr>
+      </p:pic>
+      <p:sp>
+        <p:nvSpPr>
+          <p:cNvPr id="7" name="TextBox 6">
+            <a:extLst>
+              <a:ext uri="{FF2B5EF4-FFF2-40B4-BE49-F238E27FC236}">
+                <a16:creationId xmlns:a16="http://schemas.microsoft.com/office/drawing/2014/main" id="{91D14F98-F820-4E4A-A7D3-A286C0879159}"/>
+              </a:ext>
+            </a:extLst>
+          </p:cNvPr>
+          <p:cNvSpPr txBox="1"/>
+          <p:nvPr/>
+        </p:nvSpPr>
+        <p:spPr>
+          <a:xfrm>
+            <a:off x="446372" y="2505854"/>
+            <a:ext cx="4376166" cy="646331"/>
+          </a:xfrm>
+          <a:prstGeom prst="rect">
+            <a:avLst/>
+          </a:prstGeom>
+          <a:noFill/>
+        </p:spPr>
+        <p:txBody>
+          <a:bodyPr wrap="square" rtlCol="0">
+            <a:spAutoFit/>
+          </a:bodyPr>
+          <a:lstStyle/>
+          <a:p>
+            <a:pPr algn="ctr"/>
+            <a:r>
+              <a:rPr lang="uk-UA" dirty="0"/>
+              <a:t>Таблиця піків гірчичного газу, по яким проводилась </a:t>
+            </a:r>
+            <a:r>
+              <a:rPr lang="uk-UA" dirty="0" err="1"/>
+              <a:t>валідація</a:t>
+            </a:r>
+            <a:endParaRPr lang="ru-RU" dirty="0"/>
+          </a:p>
+        </p:txBody>
+      </p:sp>
+      <p:sp>
+        <p:nvSpPr>
+          <p:cNvPr id="8" name="TextBox 7">
+            <a:extLst>
+              <a:ext uri="{FF2B5EF4-FFF2-40B4-BE49-F238E27FC236}">
+                <a16:creationId xmlns:a16="http://schemas.microsoft.com/office/drawing/2014/main" id="{0CB497F7-8BB8-4514-B084-3758931AAC00}"/>
+              </a:ext>
+            </a:extLst>
+          </p:cNvPr>
+          <p:cNvSpPr txBox="1"/>
+          <p:nvPr/>
+        </p:nvSpPr>
+        <p:spPr>
+          <a:xfrm>
+            <a:off x="5525474" y="5845394"/>
+            <a:ext cx="6348549" cy="369332"/>
+          </a:xfrm>
+          <a:prstGeom prst="rect">
+            <a:avLst/>
+          </a:prstGeom>
+          <a:noFill/>
+        </p:spPr>
+        <p:txBody>
+          <a:bodyPr wrap="square" rtlCol="0">
+            <a:spAutoFit/>
+          </a:bodyPr>
+          <a:lstStyle/>
+          <a:p>
+            <a:r>
+              <a:rPr lang="uk-UA" dirty="0"/>
+              <a:t>Спектр гірчичного газу, при опроміненні нейтронами 14.1 </a:t>
+            </a:r>
+            <a:r>
+              <a:rPr lang="uk-UA" dirty="0" err="1"/>
+              <a:t>МеВ</a:t>
+            </a:r>
+            <a:endParaRPr lang="ru-RU" dirty="0"/>
+          </a:p>
+        </p:txBody>
+      </p:sp>
     </p:spTree>
     <p:extLst>
       <p:ext uri="{BB962C8B-B14F-4D97-AF65-F5344CB8AC3E}">
@@ -5568,7 +5887,7 @@
         </p:nvSpPr>
         <p:spPr>
           <a:xfrm>
-            <a:off x="0" y="0"/>
+            <a:off x="609600" y="195721"/>
             <a:ext cx="10515600" cy="1325563"/>
           </a:xfrm>
         </p:spPr>
@@ -5616,8 +5935,8 @@
         </p:blipFill>
         <p:spPr>
           <a:xfrm>
-            <a:off x="993578" y="858503"/>
-            <a:ext cx="9874718" cy="5743459"/>
+            <a:off x="1289270" y="1154594"/>
+            <a:ext cx="9204559" cy="5353673"/>
           </a:xfrm>
         </p:spPr>
       </p:pic>

</xml_diff>